<commit_message>
#1332 inject JdbcTemplate into JdbcCodelist (at en)
</commit_message>
<xml_diff>
--- a/source_en/ArchitectureInDetail/images_CodeList/materialCodeList.pptx
+++ b/source_en/ArchitectureInDetail/images_CodeList/materialCodeList.pptx
@@ -111,6 +111,22 @@
       </a:defRPr>
     </a:lvl9pPr>
   </p:defaultTextStyle>
+  <p:extLst>
+    <p:ext uri="{EFAFB233-063F-42B5-8137-9DF3F51BA10A}">
+      <p15:sldGuideLst xmlns:p15="http://schemas.microsoft.com/office/powerpoint/2012/main">
+        <p15:guide id="1" orient="horz" pos="2160">
+          <p15:clr>
+            <a:srgbClr val="A4A3A4"/>
+          </p15:clr>
+        </p15:guide>
+        <p15:guide id="2" pos="2880">
+          <p15:clr>
+            <a:srgbClr val="A4A3A4"/>
+          </p15:clr>
+        </p15:guide>
+      </p15:sldGuideLst>
+    </p:ext>
+  </p:extLst>
 </p:presentation>
 </file>
 
@@ -197,7 +213,7 @@
             <a:fld id="{3BB47352-BF5A-4CD2-B029-996118CD8E01}" type="datetimeFigureOut">
               <a:rPr kumimoji="1" lang="ja-JP" altLang="en-US" smtClean="0"/>
               <a:pPr/>
-              <a:t>2014/12/17</a:t>
+              <a:t>2015/10/8</a:t>
             </a:fld>
             <a:endParaRPr kumimoji="1" lang="ja-JP" altLang="en-US" dirty="0"/>
           </a:p>
@@ -680,7 +696,7 @@
             <a:fld id="{7B9B12EC-6AA0-374B-A2D3-850081A07A26}" type="datetimeFigureOut">
               <a:rPr kumimoji="1" lang="ja-JP" altLang="en-US" smtClean="0"/>
               <a:pPr/>
-              <a:t>2014/12/17</a:t>
+              <a:t>2015/10/8</a:t>
             </a:fld>
             <a:endParaRPr kumimoji="1" lang="ja-JP" altLang="en-US" dirty="0"/>
           </a:p>
@@ -884,7 +900,7 @@
             <a:fld id="{7B9B12EC-6AA0-374B-A2D3-850081A07A26}" type="datetimeFigureOut">
               <a:rPr kumimoji="1" lang="ja-JP" altLang="en-US" smtClean="0"/>
               <a:pPr/>
-              <a:t>2014/12/17</a:t>
+              <a:t>2015/10/8</a:t>
             </a:fld>
             <a:endParaRPr kumimoji="1" lang="ja-JP" altLang="en-US" dirty="0"/>
           </a:p>
@@ -1098,7 +1114,7 @@
             <a:fld id="{7B9B12EC-6AA0-374B-A2D3-850081A07A26}" type="datetimeFigureOut">
               <a:rPr kumimoji="1" lang="ja-JP" altLang="en-US" smtClean="0"/>
               <a:pPr/>
-              <a:t>2014/12/17</a:t>
+              <a:t>2015/10/8</a:t>
             </a:fld>
             <a:endParaRPr kumimoji="1" lang="ja-JP" altLang="en-US" dirty="0"/>
           </a:p>
@@ -1302,7 +1318,7 @@
             <a:fld id="{7B9B12EC-6AA0-374B-A2D3-850081A07A26}" type="datetimeFigureOut">
               <a:rPr kumimoji="1" lang="ja-JP" altLang="en-US" smtClean="0"/>
               <a:pPr/>
-              <a:t>2014/12/17</a:t>
+              <a:t>2015/10/8</a:t>
             </a:fld>
             <a:endParaRPr kumimoji="1" lang="ja-JP" altLang="en-US" dirty="0"/>
           </a:p>
@@ -1550,7 +1566,7 @@
             <a:fld id="{7B9B12EC-6AA0-374B-A2D3-850081A07A26}" type="datetimeFigureOut">
               <a:rPr kumimoji="1" lang="ja-JP" altLang="en-US" smtClean="0"/>
               <a:pPr/>
-              <a:t>2014/12/17</a:t>
+              <a:t>2015/10/8</a:t>
             </a:fld>
             <a:endParaRPr kumimoji="1" lang="ja-JP" altLang="en-US" dirty="0"/>
           </a:p>
@@ -1904,7 +1920,7 @@
             <a:fld id="{7B9B12EC-6AA0-374B-A2D3-850081A07A26}" type="datetimeFigureOut">
               <a:rPr kumimoji="1" lang="ja-JP" altLang="en-US" smtClean="0"/>
               <a:pPr/>
-              <a:t>2014/12/17</a:t>
+              <a:t>2015/10/8</a:t>
             </a:fld>
             <a:endParaRPr kumimoji="1" lang="ja-JP" altLang="en-US" dirty="0"/>
           </a:p>
@@ -2392,7 +2408,7 @@
             <a:fld id="{7B9B12EC-6AA0-374B-A2D3-850081A07A26}" type="datetimeFigureOut">
               <a:rPr kumimoji="1" lang="ja-JP" altLang="en-US" smtClean="0"/>
               <a:pPr/>
-              <a:t>2014/12/17</a:t>
+              <a:t>2015/10/8</a:t>
             </a:fld>
             <a:endParaRPr kumimoji="1" lang="ja-JP" altLang="en-US" dirty="0"/>
           </a:p>
@@ -2512,7 +2528,7 @@
             <a:fld id="{7B9B12EC-6AA0-374B-A2D3-850081A07A26}" type="datetimeFigureOut">
               <a:rPr kumimoji="1" lang="ja-JP" altLang="en-US" smtClean="0"/>
               <a:pPr/>
-              <a:t>2014/12/17</a:t>
+              <a:t>2015/10/8</a:t>
             </a:fld>
             <a:endParaRPr kumimoji="1" lang="ja-JP" altLang="en-US" dirty="0"/>
           </a:p>
@@ -2609,7 +2625,7 @@
             <a:fld id="{7B9B12EC-6AA0-374B-A2D3-850081A07A26}" type="datetimeFigureOut">
               <a:rPr kumimoji="1" lang="ja-JP" altLang="en-US" smtClean="0"/>
               <a:pPr/>
-              <a:t>2014/12/17</a:t>
+              <a:t>2015/10/8</a:t>
             </a:fld>
             <a:endParaRPr kumimoji="1" lang="ja-JP" altLang="en-US" dirty="0"/>
           </a:p>
@@ -2920,7 +2936,7 @@
             <a:fld id="{7B9B12EC-6AA0-374B-A2D3-850081A07A26}" type="datetimeFigureOut">
               <a:rPr kumimoji="1" lang="ja-JP" altLang="en-US" smtClean="0"/>
               <a:pPr/>
-              <a:t>2014/12/17</a:t>
+              <a:t>2015/10/8</a:t>
             </a:fld>
             <a:endParaRPr kumimoji="1" lang="ja-JP" altLang="en-US" dirty="0"/>
           </a:p>
@@ -3175,7 +3191,7 @@
             <a:fld id="{7B9B12EC-6AA0-374B-A2D3-850081A07A26}" type="datetimeFigureOut">
               <a:rPr kumimoji="1" lang="ja-JP" altLang="en-US" smtClean="0"/>
               <a:pPr/>
-              <a:t>2014/12/17</a:t>
+              <a:t>2015/10/8</a:t>
             </a:fld>
             <a:endParaRPr kumimoji="1" lang="ja-JP" altLang="en-US" dirty="0"/>
           </a:p>
@@ -3422,7 +3438,7 @@
             <a:fld id="{7B9B12EC-6AA0-374B-A2D3-850081A07A26}" type="datetimeFigureOut">
               <a:rPr kumimoji="1" lang="ja-JP" altLang="en-US" smtClean="0"/>
               <a:pPr/>
-              <a:t>2014/12/17</a:t>
+              <a:t>2015/10/8</a:t>
             </a:fld>
             <a:endParaRPr kumimoji="1" lang="ja-JP" altLang="en-US" dirty="0"/>
           </a:p>
@@ -9481,7 +9497,71 @@
                   <a:schemeClr val="tx1"/>
                 </a:solidFill>
               </a:rPr>
-              <a:t>  &lt;property name="dataSource" ref="dataSource" /&gt;</a:t>
+              <a:t>  &lt;property name</a:t>
+            </a:r>
+            <a:r>
+              <a:rPr lang="en-US" sz="1200" b="1" dirty="0" smtClean="0">
+                <a:solidFill>
+                  <a:schemeClr val="tx1"/>
+                </a:solidFill>
+              </a:rPr>
+              <a:t>="</a:t>
+            </a:r>
+            <a:r>
+              <a:rPr lang="en-US" altLang="ja-JP" sz="1200" b="1" dirty="0" err="1" smtClean="0">
+                <a:solidFill>
+                  <a:schemeClr val="tx1"/>
+                </a:solidFill>
+              </a:rPr>
+              <a:t>jdbcTemplate</a:t>
+            </a:r>
+            <a:r>
+              <a:rPr lang="en-US" sz="1200" b="1" dirty="0" smtClean="0">
+                <a:solidFill>
+                  <a:schemeClr val="tx1"/>
+                </a:solidFill>
+              </a:rPr>
+              <a:t>" </a:t>
+            </a:r>
+            <a:r>
+              <a:rPr lang="en-US" sz="1200" b="1" dirty="0" smtClean="0">
+                <a:solidFill>
+                  <a:schemeClr val="tx1"/>
+                </a:solidFill>
+              </a:rPr>
+              <a:t>ref</a:t>
+            </a:r>
+            <a:r>
+              <a:rPr lang="en-US" sz="1200" b="1" dirty="0" smtClean="0">
+                <a:solidFill>
+                  <a:schemeClr val="tx1"/>
+                </a:solidFill>
+              </a:rPr>
+              <a:t>="</a:t>
+            </a:r>
+            <a:r>
+              <a:rPr lang="en-US" sz="1200" b="1" dirty="0" err="1" smtClean="0">
+                <a:solidFill>
+                  <a:schemeClr val="tx1"/>
+                </a:solidFill>
+              </a:rPr>
+              <a:t>jdbcTemplateForCodeList</a:t>
+            </a:r>
+            <a:r>
+              <a:rPr lang="en-US" sz="1200" b="1" dirty="0" smtClean="0">
+                <a:solidFill>
+                  <a:schemeClr val="tx1"/>
+                </a:solidFill>
+              </a:rPr>
+              <a:t>" </a:t>
+            </a:r>
+            <a:r>
+              <a:rPr lang="en-US" sz="1200" b="1" dirty="0" smtClean="0">
+                <a:solidFill>
+                  <a:schemeClr val="tx1"/>
+                </a:solidFill>
+              </a:rPr>
+              <a:t>/&gt;</a:t>
             </a:r>
           </a:p>
           <a:p>

</xml_diff>